<commit_message>
Update MongoDB config and appsettings
</commit_message>
<xml_diff>
--- a/src/imgcre.pptx
+++ b/src/imgcre.pptx
@@ -261,7 +261,7 @@
           <a:p>
             <a:fld id="{295B06FE-37B6-48BF-A4B7-00A16CD004B8}" type="datetimeFigureOut">
               <a:rPr kumimoji="1" lang="ja-JP" altLang="en-US" smtClean="0"/>
-              <a:t>2025/9/12</a:t>
+              <a:t>2025/10/2</a:t>
             </a:fld>
             <a:endParaRPr kumimoji="1" lang="ja-JP" altLang="en-US"/>
           </a:p>
@@ -491,7 +491,7 @@
           <a:p>
             <a:fld id="{295B06FE-37B6-48BF-A4B7-00A16CD004B8}" type="datetimeFigureOut">
               <a:rPr kumimoji="1" lang="ja-JP" altLang="en-US" smtClean="0"/>
-              <a:t>2025/9/12</a:t>
+              <a:t>2025/10/2</a:t>
             </a:fld>
             <a:endParaRPr kumimoji="1" lang="ja-JP" altLang="en-US"/>
           </a:p>
@@ -731,7 +731,7 @@
           <a:p>
             <a:fld id="{295B06FE-37B6-48BF-A4B7-00A16CD004B8}" type="datetimeFigureOut">
               <a:rPr kumimoji="1" lang="ja-JP" altLang="en-US" smtClean="0"/>
-              <a:t>2025/9/12</a:t>
+              <a:t>2025/10/2</a:t>
             </a:fld>
             <a:endParaRPr kumimoji="1" lang="ja-JP" altLang="en-US"/>
           </a:p>
@@ -961,7 +961,7 @@
           <a:p>
             <a:fld id="{295B06FE-37B6-48BF-A4B7-00A16CD004B8}" type="datetimeFigureOut">
               <a:rPr kumimoji="1" lang="ja-JP" altLang="en-US" smtClean="0"/>
-              <a:t>2025/9/12</a:t>
+              <a:t>2025/10/2</a:t>
             </a:fld>
             <a:endParaRPr kumimoji="1" lang="ja-JP" altLang="en-US"/>
           </a:p>
@@ -1236,7 +1236,7 @@
           <a:p>
             <a:fld id="{295B06FE-37B6-48BF-A4B7-00A16CD004B8}" type="datetimeFigureOut">
               <a:rPr kumimoji="1" lang="ja-JP" altLang="en-US" smtClean="0"/>
-              <a:t>2025/9/12</a:t>
+              <a:t>2025/10/2</a:t>
             </a:fld>
             <a:endParaRPr kumimoji="1" lang="ja-JP" altLang="en-US"/>
           </a:p>
@@ -1565,7 +1565,7 @@
           <a:p>
             <a:fld id="{295B06FE-37B6-48BF-A4B7-00A16CD004B8}" type="datetimeFigureOut">
               <a:rPr kumimoji="1" lang="ja-JP" altLang="en-US" smtClean="0"/>
-              <a:t>2025/9/12</a:t>
+              <a:t>2025/10/2</a:t>
             </a:fld>
             <a:endParaRPr kumimoji="1" lang="ja-JP" altLang="en-US"/>
           </a:p>
@@ -2041,7 +2041,7 @@
           <a:p>
             <a:fld id="{295B06FE-37B6-48BF-A4B7-00A16CD004B8}" type="datetimeFigureOut">
               <a:rPr kumimoji="1" lang="ja-JP" altLang="en-US" smtClean="0"/>
-              <a:t>2025/9/12</a:t>
+              <a:t>2025/10/2</a:t>
             </a:fld>
             <a:endParaRPr kumimoji="1" lang="ja-JP" altLang="en-US"/>
           </a:p>
@@ -2182,7 +2182,7 @@
           <a:p>
             <a:fld id="{295B06FE-37B6-48BF-A4B7-00A16CD004B8}" type="datetimeFigureOut">
               <a:rPr kumimoji="1" lang="ja-JP" altLang="en-US" smtClean="0"/>
-              <a:t>2025/9/12</a:t>
+              <a:t>2025/10/2</a:t>
             </a:fld>
             <a:endParaRPr kumimoji="1" lang="ja-JP" altLang="en-US"/>
           </a:p>
@@ -2295,7 +2295,7 @@
           <a:p>
             <a:fld id="{295B06FE-37B6-48BF-A4B7-00A16CD004B8}" type="datetimeFigureOut">
               <a:rPr kumimoji="1" lang="ja-JP" altLang="en-US" smtClean="0"/>
-              <a:t>2025/9/12</a:t>
+              <a:t>2025/10/2</a:t>
             </a:fld>
             <a:endParaRPr kumimoji="1" lang="ja-JP" altLang="en-US"/>
           </a:p>
@@ -2638,7 +2638,7 @@
           <a:p>
             <a:fld id="{295B06FE-37B6-48BF-A4B7-00A16CD004B8}" type="datetimeFigureOut">
               <a:rPr kumimoji="1" lang="ja-JP" altLang="en-US" smtClean="0"/>
-              <a:t>2025/9/12</a:t>
+              <a:t>2025/10/2</a:t>
             </a:fld>
             <a:endParaRPr kumimoji="1" lang="ja-JP" altLang="en-US"/>
           </a:p>
@@ -2926,7 +2926,7 @@
           <a:p>
             <a:fld id="{295B06FE-37B6-48BF-A4B7-00A16CD004B8}" type="datetimeFigureOut">
               <a:rPr kumimoji="1" lang="ja-JP" altLang="en-US" smtClean="0"/>
-              <a:t>2025/9/12</a:t>
+              <a:t>2025/10/2</a:t>
             </a:fld>
             <a:endParaRPr kumimoji="1" lang="ja-JP" altLang="en-US"/>
           </a:p>
@@ -3199,7 +3199,7 @@
           <a:p>
             <a:fld id="{295B06FE-37B6-48BF-A4B7-00A16CD004B8}" type="datetimeFigureOut">
               <a:rPr kumimoji="1" lang="ja-JP" altLang="en-US" smtClean="0"/>
-              <a:t>2025/9/12</a:t>
+              <a:t>2025/10/2</a:t>
             </a:fld>
             <a:endParaRPr kumimoji="1" lang="ja-JP" altLang="en-US"/>
           </a:p>
@@ -4296,6 +4296,126 @@
           <a:chExt cx="0" cy="0"/>
         </a:xfrm>
       </p:grpSpPr>
+      <p:grpSp>
+        <p:nvGrpSpPr>
+          <p:cNvPr id="4" name="グループ化 3">
+            <a:extLst>
+              <a:ext uri="{FF2B5EF4-FFF2-40B4-BE49-F238E27FC236}">
+                <a16:creationId xmlns:a16="http://schemas.microsoft.com/office/drawing/2014/main" id="{A3E5526C-1712-9722-6437-439098718E42}"/>
+              </a:ext>
+            </a:extLst>
+          </p:cNvPr>
+          <p:cNvGrpSpPr/>
+          <p:nvPr/>
+        </p:nvGrpSpPr>
+        <p:grpSpPr>
+          <a:xfrm>
+            <a:off x="4758812" y="1582993"/>
+            <a:ext cx="2163097" cy="737419"/>
+            <a:chOff x="4758812" y="1582993"/>
+            <a:chExt cx="2163097" cy="737419"/>
+          </a:xfrm>
+        </p:grpSpPr>
+        <p:sp>
+          <p:nvSpPr>
+            <p:cNvPr id="2" name="矢印: V 字型 1">
+              <a:extLst>
+                <a:ext uri="{FF2B5EF4-FFF2-40B4-BE49-F238E27FC236}">
+                  <a16:creationId xmlns:a16="http://schemas.microsoft.com/office/drawing/2014/main" id="{9E0205BE-A713-CB6E-1DC3-9F8BF7DE980F}"/>
+                </a:ext>
+              </a:extLst>
+            </p:cNvPr>
+            <p:cNvSpPr/>
+            <p:nvPr/>
+          </p:nvSpPr>
+          <p:spPr>
+            <a:xfrm rot="10800000">
+              <a:off x="4758812" y="1582993"/>
+              <a:ext cx="2163097" cy="737419"/>
+            </a:xfrm>
+            <a:prstGeom prst="notchedRightArrow">
+              <a:avLst>
+                <a:gd name="adj1" fmla="val 100000"/>
+                <a:gd name="adj2" fmla="val 50000"/>
+              </a:avLst>
+            </a:prstGeom>
+            <a:solidFill>
+              <a:srgbClr val="F03510"/>
+            </a:solidFill>
+            <a:ln w="12700">
+              <a:solidFill>
+                <a:srgbClr val="FF0000"/>
+              </a:solidFill>
+              <a:prstDash val="solid"/>
+            </a:ln>
+          </p:spPr>
+          <p:style>
+            <a:lnRef idx="2">
+              <a:schemeClr val="accent1">
+                <a:shade val="15000"/>
+              </a:schemeClr>
+            </a:lnRef>
+            <a:fillRef idx="1">
+              <a:schemeClr val="accent1"/>
+            </a:fillRef>
+            <a:effectRef idx="0">
+              <a:schemeClr val="accent1"/>
+            </a:effectRef>
+            <a:fontRef idx="minor">
+              <a:schemeClr val="lt1"/>
+            </a:fontRef>
+          </p:style>
+          <p:txBody>
+            <a:bodyPr rtlCol="0" anchor="ctr"/>
+            <a:lstStyle/>
+            <a:p>
+              <a:pPr algn="ctr"/>
+              <a:endParaRPr kumimoji="1" lang="ja-JP" altLang="en-US"/>
+            </a:p>
+          </p:txBody>
+        </p:sp>
+        <p:sp>
+          <p:nvSpPr>
+            <p:cNvPr id="3" name="テキスト ボックス 2">
+              <a:extLst>
+                <a:ext uri="{FF2B5EF4-FFF2-40B4-BE49-F238E27FC236}">
+                  <a16:creationId xmlns:a16="http://schemas.microsoft.com/office/drawing/2014/main" id="{C1DED9EE-F5A2-488A-DB50-C7D01838D3B8}"/>
+                </a:ext>
+              </a:extLst>
+            </p:cNvPr>
+            <p:cNvSpPr txBox="1"/>
+            <p:nvPr/>
+          </p:nvSpPr>
+          <p:spPr>
+            <a:xfrm>
+              <a:off x="5132474" y="1659314"/>
+              <a:ext cx="1415772" cy="584775"/>
+            </a:xfrm>
+            <a:prstGeom prst="rect">
+              <a:avLst/>
+            </a:prstGeom>
+            <a:noFill/>
+          </p:spPr>
+          <p:txBody>
+            <a:bodyPr wrap="none" rtlCol="0">
+              <a:spAutoFit/>
+            </a:bodyPr>
+            <a:lstStyle/>
+            <a:p>
+              <a:r>
+                <a:rPr kumimoji="1" lang="ja-JP" altLang="en-US" sz="3200" dirty="0">
+                  <a:solidFill>
+                    <a:schemeClr val="bg1"/>
+                  </a:solidFill>
+                  <a:latin typeface="HG創英角ｺﾞｼｯｸUB" panose="020B0909000000000000" pitchFamily="49" charset="-128"/>
+                  <a:ea typeface="HG創英角ｺﾞｼｯｸUB" panose="020B0909000000000000" pitchFamily="49" charset="-128"/>
+                </a:rPr>
+                <a:t>未採点</a:t>
+              </a:r>
+            </a:p>
+          </p:txBody>
+        </p:sp>
+      </p:grpSp>
     </p:spTree>
     <p:extLst>
       <p:ext uri="{BB962C8B-B14F-4D97-AF65-F5344CB8AC3E}">

</xml_diff>